<commit_message>
Change line number 22 to 21
</commit_message>
<xml_diff>
--- a/lesson-react-60-debugging/react-debugging.pptx
+++ b/lesson-react-60-debugging/react-debugging.pptx
@@ -1954,7 +1954,7 @@
           <a:noFill/>
           <a:extLst>
             <a:ext uri="{909E8E84-426E-40dd-AFC4-6F175D3DCCD1}">
-              <a14:hiddenFill xmlns="" xmlns:a14="http://schemas.microsoft.com/office/drawing/2010/main">
+              <a14:hiddenFill xmlns:a14="http://schemas.microsoft.com/office/drawing/2010/main" xmlns="">
                 <a:solidFill>
                   <a:srgbClr val="FFFFFF"/>
                 </a:solidFill>
@@ -11338,7 +11338,19 @@
             </a:pPr>
             <a:r>
               <a:rPr lang="en-US" sz="2000" dirty="0" smtClean="0"/>
-              <a:t>Put a breakpoint on line 22 in the toggle() function</a:t>
+              <a:t>Put a breakpoint on </a:t>
+            </a:r>
+            <a:r>
+              <a:rPr lang="en-US" sz="2000" smtClean="0"/>
+              <a:t>line </a:t>
+            </a:r>
+            <a:r>
+              <a:rPr lang="en-US" sz="2000" smtClean="0"/>
+              <a:t>21 </a:t>
+            </a:r>
+            <a:r>
+              <a:rPr lang="en-US" sz="2000" dirty="0" smtClean="0"/>
+              <a:t>in the toggle() function</a:t>
             </a:r>
           </a:p>
         </p:txBody>

</xml_diff>